<commit_message>
ran some additional experiments and edited powerpoint
</commit_message>
<xml_diff>
--- a/Research Update 4.5.2017.pptx
+++ b/Research Update 4.5.2017.pptx
@@ -15,6 +15,12 @@
     <p:sldId id="266" r:id="rId9"/>
     <p:sldId id="268" r:id="rId10"/>
     <p:sldId id="269" r:id="rId11"/>
+    <p:sldId id="270" r:id="rId12"/>
+    <p:sldId id="271" r:id="rId13"/>
+    <p:sldId id="272" r:id="rId14"/>
+    <p:sldId id="275" r:id="rId15"/>
+    <p:sldId id="274" r:id="rId16"/>
+    <p:sldId id="273" r:id="rId17"/>
   </p:sldIdLst>
   <p:sldSz cx="12192000" cy="6858000"/>
   <p:notesSz cx="6858000" cy="9144000"/>
@@ -252,7 +258,7 @@
           <a:p>
             <a:fld id="{342EB0C0-DC71-954C-939A-86335BE1B933}" type="datetimeFigureOut">
               <a:rPr lang="en-US" smtClean="0"/>
-              <a:t>4/10/17</a:t>
+              <a:t>4/10/2017</a:t>
             </a:fld>
             <a:endParaRPr lang="en-US"/>
           </a:p>
@@ -422,7 +428,7 @@
           <a:p>
             <a:fld id="{342EB0C0-DC71-954C-939A-86335BE1B933}" type="datetimeFigureOut">
               <a:rPr lang="en-US" smtClean="0"/>
-              <a:t>4/10/17</a:t>
+              <a:t>4/10/2017</a:t>
             </a:fld>
             <a:endParaRPr lang="en-US"/>
           </a:p>
@@ -602,7 +608,7 @@
           <a:p>
             <a:fld id="{342EB0C0-DC71-954C-939A-86335BE1B933}" type="datetimeFigureOut">
               <a:rPr lang="en-US" smtClean="0"/>
-              <a:t>4/10/17</a:t>
+              <a:t>4/10/2017</a:t>
             </a:fld>
             <a:endParaRPr lang="en-US"/>
           </a:p>
@@ -772,7 +778,7 @@
           <a:p>
             <a:fld id="{342EB0C0-DC71-954C-939A-86335BE1B933}" type="datetimeFigureOut">
               <a:rPr lang="en-US" smtClean="0"/>
-              <a:t>4/10/17</a:t>
+              <a:t>4/10/2017</a:t>
             </a:fld>
             <a:endParaRPr lang="en-US"/>
           </a:p>
@@ -1018,7 +1024,7 @@
           <a:p>
             <a:fld id="{342EB0C0-DC71-954C-939A-86335BE1B933}" type="datetimeFigureOut">
               <a:rPr lang="en-US" smtClean="0"/>
-              <a:t>4/10/17</a:t>
+              <a:t>4/10/2017</a:t>
             </a:fld>
             <a:endParaRPr lang="en-US"/>
           </a:p>
@@ -1250,7 +1256,7 @@
           <a:p>
             <a:fld id="{342EB0C0-DC71-954C-939A-86335BE1B933}" type="datetimeFigureOut">
               <a:rPr lang="en-US" smtClean="0"/>
-              <a:t>4/10/17</a:t>
+              <a:t>4/10/2017</a:t>
             </a:fld>
             <a:endParaRPr lang="en-US"/>
           </a:p>
@@ -1617,7 +1623,7 @@
           <a:p>
             <a:fld id="{342EB0C0-DC71-954C-939A-86335BE1B933}" type="datetimeFigureOut">
               <a:rPr lang="en-US" smtClean="0"/>
-              <a:t>4/10/17</a:t>
+              <a:t>4/10/2017</a:t>
             </a:fld>
             <a:endParaRPr lang="en-US"/>
           </a:p>
@@ -1735,7 +1741,7 @@
           <a:p>
             <a:fld id="{342EB0C0-DC71-954C-939A-86335BE1B933}" type="datetimeFigureOut">
               <a:rPr lang="en-US" smtClean="0"/>
-              <a:t>4/10/17</a:t>
+              <a:t>4/10/2017</a:t>
             </a:fld>
             <a:endParaRPr lang="en-US"/>
           </a:p>
@@ -1830,7 +1836,7 @@
           <a:p>
             <a:fld id="{342EB0C0-DC71-954C-939A-86335BE1B933}" type="datetimeFigureOut">
               <a:rPr lang="en-US" smtClean="0"/>
-              <a:t>4/10/17</a:t>
+              <a:t>4/10/2017</a:t>
             </a:fld>
             <a:endParaRPr lang="en-US"/>
           </a:p>
@@ -2107,7 +2113,7 @@
           <a:p>
             <a:fld id="{342EB0C0-DC71-954C-939A-86335BE1B933}" type="datetimeFigureOut">
               <a:rPr lang="en-US" smtClean="0"/>
-              <a:t>4/10/17</a:t>
+              <a:t>4/10/2017</a:t>
             </a:fld>
             <a:endParaRPr lang="en-US"/>
           </a:p>
@@ -2360,7 +2366,7 @@
           <a:p>
             <a:fld id="{342EB0C0-DC71-954C-939A-86335BE1B933}" type="datetimeFigureOut">
               <a:rPr lang="en-US" smtClean="0"/>
-              <a:t>4/10/17</a:t>
+              <a:t>4/10/2017</a:t>
             </a:fld>
             <a:endParaRPr lang="en-US"/>
           </a:p>
@@ -2573,7 +2579,7 @@
           <a:p>
             <a:fld id="{342EB0C0-DC71-954C-939A-86335BE1B933}" type="datetimeFigureOut">
               <a:rPr lang="en-US" smtClean="0"/>
-              <a:t>4/10/17</a:t>
+              <a:t>4/10/2017</a:t>
             </a:fld>
             <a:endParaRPr lang="en-US"/>
           </a:p>
@@ -3076,14 +3082,560 @@
           <a:bodyPr/>
           <a:lstStyle/>
           <a:p>
-            <a:endParaRPr lang="en-US"/>
-          </a:p>
-        </p:txBody>
-      </p:sp>
+            <a:r>
+              <a:rPr lang="en-US" dirty="0" smtClean="0"/>
+              <a:t>Revisiting Our Initial Problem with our Updated Transform:</a:t>
+            </a:r>
+            <a:endParaRPr lang="en-US" dirty="0"/>
+          </a:p>
+        </p:txBody>
+      </p:sp>
+      <p:pic>
+        <p:nvPicPr>
+          <p:cNvPr id="3" name="Picture 2"/>
+          <p:cNvPicPr>
+            <a:picLocks noChangeAspect="1"/>
+          </p:cNvPicPr>
+          <p:nvPr/>
+        </p:nvPicPr>
+        <p:blipFill>
+          <a:blip r:embed="rId2"/>
+          <a:stretch>
+            <a:fillRect/>
+          </a:stretch>
+        </p:blipFill>
+        <p:spPr>
+          <a:xfrm>
+            <a:off x="2699338" y="2279738"/>
+            <a:ext cx="5160935" cy="3864279"/>
+          </a:xfrm>
+          <a:prstGeom prst="rect">
+            <a:avLst/>
+          </a:prstGeom>
+        </p:spPr>
+      </p:pic>
     </p:spTree>
     <p:extLst>
       <p:ext uri="{BB962C8B-B14F-4D97-AF65-F5344CB8AC3E}">
         <p14:creationId xmlns:p14="http://schemas.microsoft.com/office/powerpoint/2010/main" val="820127998"/>
+      </p:ext>
+    </p:extLst>
+  </p:cSld>
+  <p:clrMapOvr>
+    <a:masterClrMapping/>
+  </p:clrMapOvr>
+</p:sld>
+</file>
+
+<file path=ppt/slides/slide11.xml><?xml version="1.0" encoding="utf-8"?>
+<p:sld xmlns:a="http://schemas.openxmlformats.org/drawingml/2006/main" xmlns:r="http://schemas.openxmlformats.org/officeDocument/2006/relationships" xmlns:p="http://schemas.openxmlformats.org/presentationml/2006/main">
+  <p:cSld>
+    <p:spTree>
+      <p:nvGrpSpPr>
+        <p:cNvPr id="1" name=""/>
+        <p:cNvGrpSpPr/>
+        <p:nvPr/>
+      </p:nvGrpSpPr>
+      <p:grpSpPr>
+        <a:xfrm>
+          <a:off x="0" y="0"/>
+          <a:ext cx="0" cy="0"/>
+          <a:chOff x="0" y="0"/>
+          <a:chExt cx="0" cy="0"/>
+        </a:xfrm>
+      </p:grpSpPr>
+      <p:sp>
+        <p:nvSpPr>
+          <p:cNvPr id="2" name="Title 1"/>
+          <p:cNvSpPr>
+            <a:spLocks noGrp="1"/>
+          </p:cNvSpPr>
+          <p:nvPr>
+            <p:ph type="title"/>
+          </p:nvPr>
+        </p:nvSpPr>
+        <p:spPr/>
+        <p:txBody>
+          <a:bodyPr/>
+          <a:lstStyle/>
+          <a:p>
+            <a:r>
+              <a:rPr lang="en-US" dirty="0" smtClean="0"/>
+              <a:t>Not multiplying by 2pi in transform</a:t>
+            </a:r>
+            <a:endParaRPr lang="en-US" dirty="0"/>
+          </a:p>
+        </p:txBody>
+      </p:sp>
+      <p:pic>
+        <p:nvPicPr>
+          <p:cNvPr id="3" name="Picture 2"/>
+          <p:cNvPicPr>
+            <a:picLocks noChangeAspect="1"/>
+          </p:cNvPicPr>
+          <p:nvPr/>
+        </p:nvPicPr>
+        <p:blipFill>
+          <a:blip r:embed="rId2"/>
+          <a:stretch>
+            <a:fillRect/>
+          </a:stretch>
+        </p:blipFill>
+        <p:spPr>
+          <a:xfrm>
+            <a:off x="1872621" y="1289897"/>
+            <a:ext cx="7119000" cy="5330391"/>
+          </a:xfrm>
+          <a:prstGeom prst="rect">
+            <a:avLst/>
+          </a:prstGeom>
+        </p:spPr>
+      </p:pic>
+    </p:spTree>
+    <p:extLst>
+      <p:ext uri="{BB962C8B-B14F-4D97-AF65-F5344CB8AC3E}">
+        <p14:creationId xmlns:p14="http://schemas.microsoft.com/office/powerpoint/2010/main" val="984577995"/>
+      </p:ext>
+    </p:extLst>
+  </p:cSld>
+  <p:clrMapOvr>
+    <a:masterClrMapping/>
+  </p:clrMapOvr>
+</p:sld>
+</file>
+
+<file path=ppt/slides/slide12.xml><?xml version="1.0" encoding="utf-8"?>
+<p:sld xmlns:a="http://schemas.openxmlformats.org/drawingml/2006/main" xmlns:r="http://schemas.openxmlformats.org/officeDocument/2006/relationships" xmlns:p="http://schemas.openxmlformats.org/presentationml/2006/main">
+  <p:cSld>
+    <p:spTree>
+      <p:nvGrpSpPr>
+        <p:cNvPr id="1" name=""/>
+        <p:cNvGrpSpPr/>
+        <p:nvPr/>
+      </p:nvGrpSpPr>
+      <p:grpSpPr>
+        <a:xfrm>
+          <a:off x="0" y="0"/>
+          <a:ext cx="0" cy="0"/>
+          <a:chOff x="0" y="0"/>
+          <a:chExt cx="0" cy="0"/>
+        </a:xfrm>
+      </p:grpSpPr>
+      <p:sp>
+        <p:nvSpPr>
+          <p:cNvPr id="2" name="Title 1"/>
+          <p:cNvSpPr>
+            <a:spLocks noGrp="1"/>
+          </p:cNvSpPr>
+          <p:nvPr>
+            <p:ph type="title"/>
+          </p:nvPr>
+        </p:nvSpPr>
+        <p:spPr/>
+        <p:txBody>
+          <a:bodyPr/>
+          <a:lstStyle/>
+          <a:p>
+            <a:r>
+              <a:rPr lang="en-US" dirty="0" smtClean="0"/>
+              <a:t>Increasing the distance of radius we simulate/number of samples:</a:t>
+            </a:r>
+            <a:endParaRPr lang="en-US" dirty="0"/>
+          </a:p>
+        </p:txBody>
+      </p:sp>
+      <p:pic>
+        <p:nvPicPr>
+          <p:cNvPr id="3" name="Picture 2"/>
+          <p:cNvPicPr>
+            <a:picLocks noChangeAspect="1"/>
+          </p:cNvPicPr>
+          <p:nvPr/>
+        </p:nvPicPr>
+        <p:blipFill>
+          <a:blip r:embed="rId2"/>
+          <a:stretch>
+            <a:fillRect/>
+          </a:stretch>
+        </p:blipFill>
+        <p:spPr>
+          <a:xfrm>
+            <a:off x="1809991" y="1390105"/>
+            <a:ext cx="7119000" cy="5330391"/>
+          </a:xfrm>
+          <a:prstGeom prst="rect">
+            <a:avLst/>
+          </a:prstGeom>
+        </p:spPr>
+      </p:pic>
+    </p:spTree>
+    <p:extLst>
+      <p:ext uri="{BB962C8B-B14F-4D97-AF65-F5344CB8AC3E}">
+        <p14:creationId xmlns:p14="http://schemas.microsoft.com/office/powerpoint/2010/main" val="3989702055"/>
+      </p:ext>
+    </p:extLst>
+  </p:cSld>
+  <p:clrMapOvr>
+    <a:masterClrMapping/>
+  </p:clrMapOvr>
+</p:sld>
+</file>
+
+<file path=ppt/slides/slide13.xml><?xml version="1.0" encoding="utf-8"?>
+<p:sld xmlns:a="http://schemas.openxmlformats.org/drawingml/2006/main" xmlns:r="http://schemas.openxmlformats.org/officeDocument/2006/relationships" xmlns:p="http://schemas.openxmlformats.org/presentationml/2006/main">
+  <p:cSld>
+    <p:spTree>
+      <p:nvGrpSpPr>
+        <p:cNvPr id="1" name=""/>
+        <p:cNvGrpSpPr/>
+        <p:nvPr/>
+      </p:nvGrpSpPr>
+      <p:grpSpPr>
+        <a:xfrm>
+          <a:off x="0" y="0"/>
+          <a:ext cx="0" cy="0"/>
+          <a:chOff x="0" y="0"/>
+          <a:chExt cx="0" cy="0"/>
+        </a:xfrm>
+      </p:grpSpPr>
+      <p:sp>
+        <p:nvSpPr>
+          <p:cNvPr id="2" name="Title 1"/>
+          <p:cNvSpPr>
+            <a:spLocks noGrp="1"/>
+          </p:cNvSpPr>
+          <p:nvPr>
+            <p:ph type="title"/>
+          </p:nvPr>
+        </p:nvSpPr>
+        <p:spPr/>
+        <p:txBody>
+          <a:bodyPr/>
+          <a:lstStyle/>
+          <a:p>
+            <a:r>
+              <a:rPr lang="en-US" dirty="0" smtClean="0"/>
+              <a:t>And again:</a:t>
+            </a:r>
+            <a:endParaRPr lang="en-US" dirty="0"/>
+          </a:p>
+        </p:txBody>
+      </p:sp>
+      <p:pic>
+        <p:nvPicPr>
+          <p:cNvPr id="3" name="Picture 2"/>
+          <p:cNvPicPr>
+            <a:picLocks noChangeAspect="1"/>
+          </p:cNvPicPr>
+          <p:nvPr/>
+        </p:nvPicPr>
+        <p:blipFill>
+          <a:blip r:embed="rId2"/>
+          <a:stretch>
+            <a:fillRect/>
+          </a:stretch>
+        </p:blipFill>
+        <p:spPr>
+          <a:xfrm>
+            <a:off x="1947777" y="1690688"/>
+            <a:ext cx="6717557" cy="5029808"/>
+          </a:xfrm>
+          <a:prstGeom prst="rect">
+            <a:avLst/>
+          </a:prstGeom>
+        </p:spPr>
+      </p:pic>
+    </p:spTree>
+    <p:extLst>
+      <p:ext uri="{BB962C8B-B14F-4D97-AF65-F5344CB8AC3E}">
+        <p14:creationId xmlns:p14="http://schemas.microsoft.com/office/powerpoint/2010/main" val="1808596013"/>
+      </p:ext>
+    </p:extLst>
+  </p:cSld>
+  <p:clrMapOvr>
+    <a:masterClrMapping/>
+  </p:clrMapOvr>
+</p:sld>
+</file>
+
+<file path=ppt/slides/slide14.xml><?xml version="1.0" encoding="utf-8"?>
+<p:sld xmlns:a="http://schemas.openxmlformats.org/drawingml/2006/main" xmlns:r="http://schemas.openxmlformats.org/officeDocument/2006/relationships" xmlns:p="http://schemas.openxmlformats.org/presentationml/2006/main">
+  <p:cSld>
+    <p:spTree>
+      <p:nvGrpSpPr>
+        <p:cNvPr id="1" name=""/>
+        <p:cNvGrpSpPr/>
+        <p:nvPr/>
+      </p:nvGrpSpPr>
+      <p:grpSpPr>
+        <a:xfrm>
+          <a:off x="0" y="0"/>
+          <a:ext cx="0" cy="0"/>
+          <a:chOff x="0" y="0"/>
+          <a:chExt cx="0" cy="0"/>
+        </a:xfrm>
+      </p:grpSpPr>
+      <p:sp>
+        <p:nvSpPr>
+          <p:cNvPr id="2" name="Title 1"/>
+          <p:cNvSpPr>
+            <a:spLocks noGrp="1"/>
+          </p:cNvSpPr>
+          <p:nvPr>
+            <p:ph type="title"/>
+          </p:nvPr>
+        </p:nvSpPr>
+        <p:spPr/>
+        <p:txBody>
+          <a:bodyPr/>
+          <a:lstStyle/>
+          <a:p>
+            <a:r>
+              <a:rPr lang="en-US" dirty="0" smtClean="0"/>
+              <a:t>Using online </a:t>
+            </a:r>
+            <a:r>
+              <a:rPr lang="en-US" dirty="0" err="1" smtClean="0"/>
+              <a:t>matlab</a:t>
+            </a:r>
+            <a:r>
+              <a:rPr lang="en-US" dirty="0" smtClean="0"/>
+              <a:t> code with and without multiplying by 2pi: </a:t>
+            </a:r>
+            <a:endParaRPr lang="en-US" dirty="0"/>
+          </a:p>
+        </p:txBody>
+      </p:sp>
+      <p:pic>
+        <p:nvPicPr>
+          <p:cNvPr id="3" name="Picture 2"/>
+          <p:cNvPicPr>
+            <a:picLocks noChangeAspect="1"/>
+          </p:cNvPicPr>
+          <p:nvPr/>
+        </p:nvPicPr>
+        <p:blipFill>
+          <a:blip r:embed="rId2"/>
+          <a:stretch>
+            <a:fillRect/>
+          </a:stretch>
+        </p:blipFill>
+        <p:spPr>
+          <a:xfrm>
+            <a:off x="0" y="2317315"/>
+            <a:ext cx="5897394" cy="4415707"/>
+          </a:xfrm>
+          <a:prstGeom prst="rect">
+            <a:avLst/>
+          </a:prstGeom>
+        </p:spPr>
+      </p:pic>
+      <p:pic>
+        <p:nvPicPr>
+          <p:cNvPr id="4" name="Picture 3"/>
+          <p:cNvPicPr>
+            <a:picLocks noChangeAspect="1"/>
+          </p:cNvPicPr>
+          <p:nvPr/>
+        </p:nvPicPr>
+        <p:blipFill>
+          <a:blip r:embed="rId3"/>
+          <a:stretch>
+            <a:fillRect/>
+          </a:stretch>
+        </p:blipFill>
+        <p:spPr>
+          <a:xfrm>
+            <a:off x="5766279" y="2317315"/>
+            <a:ext cx="6031172" cy="4515874"/>
+          </a:xfrm>
+          <a:prstGeom prst="rect">
+            <a:avLst/>
+          </a:prstGeom>
+        </p:spPr>
+      </p:pic>
+    </p:spTree>
+    <p:extLst>
+      <p:ext uri="{BB962C8B-B14F-4D97-AF65-F5344CB8AC3E}">
+        <p14:creationId xmlns:p14="http://schemas.microsoft.com/office/powerpoint/2010/main" val="1339892871"/>
+      </p:ext>
+    </p:extLst>
+  </p:cSld>
+  <p:clrMapOvr>
+    <a:masterClrMapping/>
+  </p:clrMapOvr>
+</p:sld>
+</file>
+
+<file path=ppt/slides/slide15.xml><?xml version="1.0" encoding="utf-8"?>
+<p:sld xmlns:a="http://schemas.openxmlformats.org/drawingml/2006/main" xmlns:r="http://schemas.openxmlformats.org/officeDocument/2006/relationships" xmlns:p="http://schemas.openxmlformats.org/presentationml/2006/main">
+  <p:cSld>
+    <p:spTree>
+      <p:nvGrpSpPr>
+        <p:cNvPr id="1" name=""/>
+        <p:cNvGrpSpPr/>
+        <p:nvPr/>
+      </p:nvGrpSpPr>
+      <p:grpSpPr>
+        <a:xfrm>
+          <a:off x="0" y="0"/>
+          <a:ext cx="0" cy="0"/>
+          <a:chOff x="0" y="0"/>
+          <a:chExt cx="0" cy="0"/>
+        </a:xfrm>
+      </p:grpSpPr>
+      <p:sp>
+        <p:nvSpPr>
+          <p:cNvPr id="2" name="Title 1"/>
+          <p:cNvSpPr>
+            <a:spLocks noGrp="1"/>
+          </p:cNvSpPr>
+          <p:nvPr>
+            <p:ph type="title"/>
+          </p:nvPr>
+        </p:nvSpPr>
+        <p:spPr/>
+        <p:txBody>
+          <a:bodyPr/>
+          <a:lstStyle/>
+          <a:p>
+            <a:r>
+              <a:rPr lang="en-US" dirty="0" smtClean="0"/>
+              <a:t>Lower r resolution/higher resolution</a:t>
+            </a:r>
+            <a:endParaRPr lang="en-US" dirty="0"/>
+          </a:p>
+        </p:txBody>
+      </p:sp>
+      <p:pic>
+        <p:nvPicPr>
+          <p:cNvPr id="3" name="Picture 2"/>
+          <p:cNvPicPr>
+            <a:picLocks noChangeAspect="1"/>
+          </p:cNvPicPr>
+          <p:nvPr/>
+        </p:nvPicPr>
+        <p:blipFill>
+          <a:blip r:embed="rId2"/>
+          <a:stretch>
+            <a:fillRect/>
+          </a:stretch>
+        </p:blipFill>
+        <p:spPr>
+          <a:xfrm>
+            <a:off x="1" y="1891429"/>
+            <a:ext cx="6105192" cy="4571297"/>
+          </a:xfrm>
+          <a:prstGeom prst="rect">
+            <a:avLst/>
+          </a:prstGeom>
+        </p:spPr>
+      </p:pic>
+      <p:pic>
+        <p:nvPicPr>
+          <p:cNvPr id="4" name="Picture 3"/>
+          <p:cNvPicPr>
+            <a:picLocks noChangeAspect="1"/>
+          </p:cNvPicPr>
+          <p:nvPr/>
+        </p:nvPicPr>
+        <p:blipFill>
+          <a:blip r:embed="rId3"/>
+          <a:stretch>
+            <a:fillRect/>
+          </a:stretch>
+        </p:blipFill>
+        <p:spPr>
+          <a:xfrm>
+            <a:off x="5874706" y="1891429"/>
+            <a:ext cx="6105192" cy="4571297"/>
+          </a:xfrm>
+          <a:prstGeom prst="rect">
+            <a:avLst/>
+          </a:prstGeom>
+        </p:spPr>
+      </p:pic>
+    </p:spTree>
+    <p:extLst>
+      <p:ext uri="{BB962C8B-B14F-4D97-AF65-F5344CB8AC3E}">
+        <p14:creationId xmlns:p14="http://schemas.microsoft.com/office/powerpoint/2010/main" val="2704301260"/>
+      </p:ext>
+    </p:extLst>
+  </p:cSld>
+  <p:clrMapOvr>
+    <a:masterClrMapping/>
+  </p:clrMapOvr>
+</p:sld>
+</file>
+
+<file path=ppt/slides/slide16.xml><?xml version="1.0" encoding="utf-8"?>
+<p:sld xmlns:a="http://schemas.openxmlformats.org/drawingml/2006/main" xmlns:r="http://schemas.openxmlformats.org/officeDocument/2006/relationships" xmlns:p="http://schemas.openxmlformats.org/presentationml/2006/main">
+  <p:cSld>
+    <p:spTree>
+      <p:nvGrpSpPr>
+        <p:cNvPr id="1" name=""/>
+        <p:cNvGrpSpPr/>
+        <p:nvPr/>
+      </p:nvGrpSpPr>
+      <p:grpSpPr>
+        <a:xfrm>
+          <a:off x="0" y="0"/>
+          <a:ext cx="0" cy="0"/>
+          <a:chOff x="0" y="0"/>
+          <a:chExt cx="0" cy="0"/>
+        </a:xfrm>
+      </p:grpSpPr>
+      <p:sp>
+        <p:nvSpPr>
+          <p:cNvPr id="2" name="Title 1"/>
+          <p:cNvSpPr>
+            <a:spLocks noGrp="1"/>
+          </p:cNvSpPr>
+          <p:nvPr>
+            <p:ph type="title"/>
+          </p:nvPr>
+        </p:nvSpPr>
+        <p:spPr/>
+        <p:txBody>
+          <a:bodyPr/>
+          <a:lstStyle/>
+          <a:p>
+            <a:r>
+              <a:rPr lang="en-US" dirty="0" smtClean="0"/>
+              <a:t>Tried normalizing by max:</a:t>
+            </a:r>
+            <a:endParaRPr lang="en-US" dirty="0"/>
+          </a:p>
+        </p:txBody>
+      </p:sp>
+      <p:pic>
+        <p:nvPicPr>
+          <p:cNvPr id="3" name="Picture 2"/>
+          <p:cNvPicPr>
+            <a:picLocks noChangeAspect="1"/>
+          </p:cNvPicPr>
+          <p:nvPr/>
+        </p:nvPicPr>
+        <p:blipFill>
+          <a:blip r:embed="rId2"/>
+          <a:stretch>
+            <a:fillRect/>
+          </a:stretch>
+        </p:blipFill>
+        <p:spPr>
+          <a:xfrm>
+            <a:off x="1709782" y="1227267"/>
+            <a:ext cx="7119000" cy="5330391"/>
+          </a:xfrm>
+          <a:prstGeom prst="rect">
+            <a:avLst/>
+          </a:prstGeom>
+        </p:spPr>
+      </p:pic>
+    </p:spTree>
+    <p:extLst>
+      <p:ext uri="{BB962C8B-B14F-4D97-AF65-F5344CB8AC3E}">
+        <p14:creationId xmlns:p14="http://schemas.microsoft.com/office/powerpoint/2010/main" val="2285517240"/>
       </p:ext>
     </p:extLst>
   </p:cSld>

</xml_diff>